<commit_message>
Changes in the report updated.
</commit_message>
<xml_diff>
--- a/Report.pptx
+++ b/Report.pptx
@@ -8,11 +8,13 @@
     <p:sldId id="256" r:id="rId2"/>
     <p:sldId id="257" r:id="rId3"/>
     <p:sldId id="262" r:id="rId4"/>
-    <p:sldId id="263" r:id="rId5"/>
-    <p:sldId id="258" r:id="rId6"/>
-    <p:sldId id="259" r:id="rId7"/>
-    <p:sldId id="260" r:id="rId8"/>
-    <p:sldId id="261" r:id="rId9"/>
+    <p:sldId id="264" r:id="rId5"/>
+    <p:sldId id="263" r:id="rId6"/>
+    <p:sldId id="258" r:id="rId7"/>
+    <p:sldId id="259" r:id="rId8"/>
+    <p:sldId id="260" r:id="rId9"/>
+    <p:sldId id="261" r:id="rId10"/>
+    <p:sldId id="265" r:id="rId11"/>
   </p:sldIdLst>
   <p:sldSz cx="12192000" cy="6858000"/>
   <p:notesSz cx="6858000" cy="9144000"/>
@@ -5953,15 +5955,7 @@
             <a:pPr lvl="1" algn="l"/>
             <a:r>
               <a:rPr lang="en-US" dirty="0"/>
-              <a:t> </a:t>
-            </a:r>
-            <a:r>
-              <a:rPr lang="en-US" dirty="0" err="1"/>
-              <a:t>GloveEmbedding+CNN</a:t>
-            </a:r>
-            <a:r>
-              <a:rPr lang="en-US" dirty="0"/>
-              <a:t> and Most Common 20K works vocab</a:t>
+              <a:t> Glove Embedding  + CNN and Most Common 20K works vocab</a:t>
             </a:r>
           </a:p>
           <a:p>
@@ -5990,6 +5984,113 @@
     <p:extLst>
       <p:ext uri="{BB962C8B-B14F-4D97-AF65-F5344CB8AC3E}">
         <p14:creationId xmlns:p14="http://schemas.microsoft.com/office/powerpoint/2010/main" val="3004426787"/>
+      </p:ext>
+    </p:extLst>
+  </p:cSld>
+  <p:clrMapOvr>
+    <a:masterClrMapping/>
+  </p:clrMapOvr>
+</p:sld>
+</file>
+
+<file path=ppt/slides/slide10.xml><?xml version="1.0" encoding="utf-8"?>
+<p:sld xmlns:a="http://schemas.openxmlformats.org/drawingml/2006/main" xmlns:r="http://schemas.openxmlformats.org/officeDocument/2006/relationships" xmlns:p="http://schemas.openxmlformats.org/presentationml/2006/main">
+  <p:cSld>
+    <p:spTree>
+      <p:nvGrpSpPr>
+        <p:cNvPr id="1" name=""/>
+        <p:cNvGrpSpPr/>
+        <p:nvPr/>
+      </p:nvGrpSpPr>
+      <p:grpSpPr>
+        <a:xfrm>
+          <a:off x="0" y="0"/>
+          <a:ext cx="0" cy="0"/>
+          <a:chOff x="0" y="0"/>
+          <a:chExt cx="0" cy="0"/>
+        </a:xfrm>
+      </p:grpSpPr>
+      <p:sp>
+        <p:nvSpPr>
+          <p:cNvPr id="2" name="Title 1">
+            <a:extLst>
+              <a:ext uri="{FF2B5EF4-FFF2-40B4-BE49-F238E27FC236}">
+                <a16:creationId xmlns:a16="http://schemas.microsoft.com/office/drawing/2014/main" id="{DE07250B-1546-49E8-97F7-82375A7B2D52}"/>
+              </a:ext>
+            </a:extLst>
+          </p:cNvPr>
+          <p:cNvSpPr>
+            <a:spLocks noGrp="1"/>
+          </p:cNvSpPr>
+          <p:nvPr>
+            <p:ph type="title"/>
+          </p:nvPr>
+        </p:nvSpPr>
+        <p:spPr/>
+        <p:txBody>
+          <a:bodyPr/>
+          <a:lstStyle/>
+          <a:p>
+            <a:r>
+              <a:rPr lang="en-US" dirty="0"/>
+              <a:t>Final Verdict</a:t>
+            </a:r>
+          </a:p>
+        </p:txBody>
+      </p:sp>
+      <p:sp>
+        <p:nvSpPr>
+          <p:cNvPr id="3" name="Content Placeholder 2">
+            <a:extLst>
+              <a:ext uri="{FF2B5EF4-FFF2-40B4-BE49-F238E27FC236}">
+                <a16:creationId xmlns:a16="http://schemas.microsoft.com/office/drawing/2014/main" id="{EFE3F087-5909-4577-A2F9-AA1D28D3E560}"/>
+              </a:ext>
+            </a:extLst>
+          </p:cNvPr>
+          <p:cNvSpPr>
+            <a:spLocks noGrp="1"/>
+          </p:cNvSpPr>
+          <p:nvPr>
+            <p:ph idx="1"/>
+          </p:nvPr>
+        </p:nvSpPr>
+        <p:spPr/>
+        <p:txBody>
+          <a:bodyPr/>
+          <a:lstStyle/>
+          <a:p>
+            <a:r>
+              <a:rPr lang="en-US" dirty="0"/>
+              <a:t>The results from pretrained Embeddings and CNN perform far better than Vanilla RNN. </a:t>
+            </a:r>
+          </a:p>
+          <a:p>
+            <a:r>
+              <a:rPr lang="en-US" dirty="0"/>
+              <a:t>Glove embedding also reduced the total training time that allowed us to us CNN to further </a:t>
+            </a:r>
+            <a:r>
+              <a:rPr lang="en-US"/>
+              <a:t>improve accuracy </a:t>
+            </a:r>
+            <a:r>
+              <a:rPr lang="en-US" dirty="0"/>
+              <a:t>of </a:t>
+            </a:r>
+            <a:r>
+              <a:rPr lang="en-US"/>
+              <a:t>the model.</a:t>
+            </a:r>
+          </a:p>
+          <a:p>
+            <a:endParaRPr lang="en-US" dirty="0"/>
+          </a:p>
+        </p:txBody>
+      </p:sp>
+    </p:spTree>
+    <p:extLst>
+      <p:ext uri="{BB962C8B-B14F-4D97-AF65-F5344CB8AC3E}">
+        <p14:creationId xmlns:p14="http://schemas.microsoft.com/office/powerpoint/2010/main" val="1254263711"/>
       </p:ext>
     </p:extLst>
   </p:cSld>
@@ -6219,6 +6320,114 @@
 </file>
 
 <file path=ppt/slides/slide4.xml><?xml version="1.0" encoding="utf-8"?>
+<p:sld xmlns:a="http://schemas.openxmlformats.org/drawingml/2006/main" xmlns:r="http://schemas.openxmlformats.org/officeDocument/2006/relationships" xmlns:p="http://schemas.openxmlformats.org/presentationml/2006/main">
+  <p:cSld>
+    <p:spTree>
+      <p:nvGrpSpPr>
+        <p:cNvPr id="1" name=""/>
+        <p:cNvGrpSpPr/>
+        <p:nvPr/>
+      </p:nvGrpSpPr>
+      <p:grpSpPr>
+        <a:xfrm>
+          <a:off x="0" y="0"/>
+          <a:ext cx="0" cy="0"/>
+          <a:chOff x="0" y="0"/>
+          <a:chExt cx="0" cy="0"/>
+        </a:xfrm>
+      </p:grpSpPr>
+      <p:sp>
+        <p:nvSpPr>
+          <p:cNvPr id="2" name="Title 1">
+            <a:extLst>
+              <a:ext uri="{FF2B5EF4-FFF2-40B4-BE49-F238E27FC236}">
+                <a16:creationId xmlns:a16="http://schemas.microsoft.com/office/drawing/2014/main" id="{5CFF17FB-9364-426D-B015-C4EA18BD0BCB}"/>
+              </a:ext>
+            </a:extLst>
+          </p:cNvPr>
+          <p:cNvSpPr>
+            <a:spLocks noGrp="1"/>
+          </p:cNvSpPr>
+          <p:nvPr>
+            <p:ph type="title"/>
+          </p:nvPr>
+        </p:nvSpPr>
+        <p:spPr/>
+        <p:txBody>
+          <a:bodyPr/>
+          <a:lstStyle/>
+          <a:p>
+            <a:r>
+              <a:rPr lang="en-US" dirty="0"/>
+              <a:t>Why Glove Approach ?</a:t>
+            </a:r>
+          </a:p>
+        </p:txBody>
+      </p:sp>
+      <p:sp>
+        <p:nvSpPr>
+          <p:cNvPr id="3" name="Content Placeholder 2">
+            <a:extLst>
+              <a:ext uri="{FF2B5EF4-FFF2-40B4-BE49-F238E27FC236}">
+                <a16:creationId xmlns:a16="http://schemas.microsoft.com/office/drawing/2014/main" id="{43A098A1-39B0-4E80-8E19-90C36B9B9208}"/>
+              </a:ext>
+            </a:extLst>
+          </p:cNvPr>
+          <p:cNvSpPr>
+            <a:spLocks noGrp="1"/>
+          </p:cNvSpPr>
+          <p:nvPr>
+            <p:ph idx="1"/>
+          </p:nvPr>
+        </p:nvSpPr>
+        <p:spPr/>
+        <p:txBody>
+          <a:bodyPr>
+            <a:normAutofit fontScale="92500"/>
+          </a:bodyPr>
+          <a:lstStyle/>
+          <a:p>
+            <a:r>
+              <a:rPr lang="en-US" dirty="0"/>
+              <a:t>The key concept in these word embeddings is that words that appear in similar </a:t>
+            </a:r>
+            <a:r>
+              <a:rPr lang="en-US" i="1" dirty="0"/>
+              <a:t>contexts</a:t>
+            </a:r>
+            <a:r>
+              <a:rPr lang="en-US" dirty="0"/>
+              <a:t> appear nearby in the vector space, i.e. the Euclidean distance between these two words vectors is small.</a:t>
+            </a:r>
+          </a:p>
+          <a:p>
+            <a:r>
+              <a:rPr lang="en-US" dirty="0"/>
+              <a:t>Thus Glove vector very efficiently convert word into numbers for processing.</a:t>
+            </a:r>
+          </a:p>
+          <a:p>
+            <a:r>
+              <a:rPr lang="en-US" dirty="0"/>
+              <a:t>Now as the words in the paragraphs are related and we have to exploit that inter dependence among words, CNN is the best architecture which exploit inter dependence of features and also shares features with each other making training faster than FCNN.</a:t>
+            </a:r>
+          </a:p>
+        </p:txBody>
+      </p:sp>
+    </p:spTree>
+    <p:extLst>
+      <p:ext uri="{BB962C8B-B14F-4D97-AF65-F5344CB8AC3E}">
+        <p14:creationId xmlns:p14="http://schemas.microsoft.com/office/powerpoint/2010/main" val="938145057"/>
+      </p:ext>
+    </p:extLst>
+  </p:cSld>
+  <p:clrMapOvr>
+    <a:masterClrMapping/>
+  </p:clrMapOvr>
+</p:sld>
+</file>
+
+<file path=ppt/slides/slide5.xml><?xml version="1.0" encoding="utf-8"?>
 <p:sld xmlns:a="http://schemas.openxmlformats.org/drawingml/2006/main" xmlns:r="http://schemas.openxmlformats.org/officeDocument/2006/relationships" xmlns:p="http://schemas.openxmlformats.org/presentationml/2006/main">
   <p:cSld>
     <p:spTree>
@@ -6379,7 +6588,7 @@
 </p:sld>
 </file>
 
-<file path=ppt/slides/slide5.xml><?xml version="1.0" encoding="utf-8"?>
+<file path=ppt/slides/slide6.xml><?xml version="1.0" encoding="utf-8"?>
 <p:sld xmlns:a="http://schemas.openxmlformats.org/drawingml/2006/main" xmlns:r="http://schemas.openxmlformats.org/officeDocument/2006/relationships" xmlns:p="http://schemas.openxmlformats.org/presentationml/2006/main">
   <p:cSld>
     <p:spTree>
@@ -6581,7 +6790,7 @@
 </p:sld>
 </file>
 
-<file path=ppt/slides/slide6.xml><?xml version="1.0" encoding="utf-8"?>
+<file path=ppt/slides/slide7.xml><?xml version="1.0" encoding="utf-8"?>
 <p:sld xmlns:a="http://schemas.openxmlformats.org/drawingml/2006/main" xmlns:r="http://schemas.openxmlformats.org/officeDocument/2006/relationships" xmlns:p="http://schemas.openxmlformats.org/presentationml/2006/main">
   <p:cSld>
     <p:spTree>
@@ -6704,7 +6913,7 @@
 </p:sld>
 </file>
 
-<file path=ppt/slides/slide7.xml><?xml version="1.0" encoding="utf-8"?>
+<file path=ppt/slides/slide8.xml><?xml version="1.0" encoding="utf-8"?>
 <p:sld xmlns:a="http://schemas.openxmlformats.org/drawingml/2006/main" xmlns:r="http://schemas.openxmlformats.org/officeDocument/2006/relationships" xmlns:p="http://schemas.openxmlformats.org/presentationml/2006/main">
   <p:cSld>
     <p:spTree>
@@ -6849,7 +7058,7 @@
 </p:sld>
 </file>
 
-<file path=ppt/slides/slide8.xml><?xml version="1.0" encoding="utf-8"?>
+<file path=ppt/slides/slide9.xml><?xml version="1.0" encoding="utf-8"?>
 <p:sld xmlns:a="http://schemas.openxmlformats.org/drawingml/2006/main" xmlns:r="http://schemas.openxmlformats.org/officeDocument/2006/relationships" xmlns:p="http://schemas.openxmlformats.org/presentationml/2006/main">
   <p:cSld>
     <p:spTree>

</xml_diff>